<commit_message>
doc: Add report for summary
</commit_message>
<xml_diff>
--- a/summary/slides/main.pptx
+++ b/summary/slides/main.pptx
@@ -273,7 +273,7 @@
           <a:p>
             <a:fld id="{80680FBE-A8DF-4758-9AC4-3A9E1039168F}" type="datetimeFigureOut">
               <a:rPr lang="en-US" smtClean="0"/>
-              <a:t>1/22/2018</a:t>
+              <a:t>1/25/2018</a:t>
             </a:fld>
             <a:endParaRPr lang="en-US"/>
           </a:p>
@@ -438,7 +438,7 @@
           <a:p>
             <a:fld id="{EC13577B-6902-467D-A26C-08A0DD5E4E03}" type="datetimeFigureOut">
               <a:rPr lang="en-US" smtClean="0"/>
-              <a:t>1/22/2018</a:t>
+              <a:t>1/25/2018</a:t>
             </a:fld>
             <a:endParaRPr lang="en-US"/>
           </a:p>
@@ -1593,7 +1593,7 @@
             <a:fld id="{8BEEBAAA-29B5-4AF5-BC5F-7E580C29002D}" type="datetimeFigureOut">
               <a:rPr lang="en-US" smtClean="0"/>
               <a:pPr/>
-              <a:t>1/22/2018</a:t>
+              <a:t>1/25/2018</a:t>
             </a:fld>
             <a:endParaRPr lang="en-US" dirty="0"/>
           </a:p>
@@ -2254,7 +2254,7 @@
             <a:fld id="{8BEEBAAA-29B5-4AF5-BC5F-7E580C29002D}" type="datetimeFigureOut">
               <a:rPr lang="en-US" smtClean="0"/>
               <a:pPr/>
-              <a:t>1/22/2018</a:t>
+              <a:t>1/25/2018</a:t>
             </a:fld>
             <a:endParaRPr lang="en-US" dirty="0"/>
           </a:p>
@@ -2756,12 +2756,12 @@
         <p:spPr>
           <a:xfrm>
             <a:off x="855620" y="2933105"/>
-            <a:ext cx="9582736" cy="1137793"/>
+            <a:ext cx="9582736" cy="2164195"/>
           </a:xfrm>
         </p:spPr>
         <p:txBody>
           <a:bodyPr>
-            <a:normAutofit/>
+            <a:normAutofit fontScale="92500" lnSpcReduction="20000"/>
           </a:bodyPr>
           <a:lstStyle/>
           <a:p>
@@ -2777,6 +2777,114 @@
               </a:rPr>
               <a:t>An overview.</a:t>
             </a:r>
+          </a:p>
+          <a:p>
+            <a:pPr marL="0" indent="0">
+              <a:buNone/>
+            </a:pPr>
+            <a:r>
+              <a:rPr lang="en-US" sz="2400" dirty="0" err="1">
+                <a:solidFill>
+                  <a:schemeClr val="bg1"/>
+                </a:solidFill>
+                <a:latin typeface="+mj-lt"/>
+              </a:rPr>
+              <a:t>Tr</a:t>
+            </a:r>
+            <a:r>
+              <a:rPr lang="vi-VN" sz="2400" dirty="0">
+                <a:solidFill>
+                  <a:schemeClr val="bg1"/>
+                </a:solidFill>
+                <a:latin typeface="+mj-lt"/>
+              </a:rPr>
+              <a:t>ư</a:t>
+            </a:r>
+            <a:r>
+              <a:rPr lang="en-US" sz="2400" dirty="0" err="1">
+                <a:solidFill>
+                  <a:schemeClr val="bg1"/>
+                </a:solidFill>
+                <a:latin typeface="+mj-lt"/>
+              </a:rPr>
+              <a:t>ơng</a:t>
+            </a:r>
+            <a:r>
+              <a:rPr lang="en-US" sz="2400">
+                <a:solidFill>
+                  <a:schemeClr val="bg1"/>
+                </a:solidFill>
+                <a:latin typeface="+mj-lt"/>
+              </a:rPr>
+              <a:t> Phúc Anh– </a:t>
+            </a:r>
+            <a:r>
+              <a:rPr lang="en-US" sz="2400" dirty="0">
+                <a:solidFill>
+                  <a:schemeClr val="bg1"/>
+                </a:solidFill>
+                <a:latin typeface="+mj-lt"/>
+              </a:rPr>
+              <a:t>14520040</a:t>
+            </a:r>
+          </a:p>
+          <a:p>
+            <a:pPr marL="0" indent="0">
+              <a:buNone/>
+            </a:pPr>
+            <a:r>
+              <a:rPr lang="en-US" sz="2400" dirty="0">
+                <a:solidFill>
+                  <a:schemeClr val="bg1"/>
+                </a:solidFill>
+                <a:latin typeface="+mj-lt"/>
+              </a:rPr>
+              <a:t>GVHD: Mai </a:t>
+            </a:r>
+            <a:r>
+              <a:rPr lang="en-US" sz="2400" dirty="0" err="1">
+                <a:solidFill>
+                  <a:schemeClr val="bg1"/>
+                </a:solidFill>
+                <a:latin typeface="+mj-lt"/>
+              </a:rPr>
+              <a:t>Tiến</a:t>
+            </a:r>
+            <a:r>
+              <a:rPr lang="en-US" sz="2400" dirty="0">
+                <a:solidFill>
+                  <a:schemeClr val="bg1"/>
+                </a:solidFill>
+                <a:latin typeface="+mj-lt"/>
+              </a:rPr>
+              <a:t> </a:t>
+            </a:r>
+            <a:r>
+              <a:rPr lang="en-US" sz="2400" dirty="0" err="1">
+                <a:solidFill>
+                  <a:schemeClr val="bg1"/>
+                </a:solidFill>
+                <a:latin typeface="+mj-lt"/>
+              </a:rPr>
+              <a:t>Dũng</a:t>
+            </a:r>
+            <a:endParaRPr lang="en-US" sz="2400" dirty="0">
+              <a:solidFill>
+                <a:schemeClr val="bg1"/>
+              </a:solidFill>
+              <a:latin typeface="+mj-lt"/>
+            </a:endParaRPr>
+          </a:p>
+          <a:p>
+            <a:pPr marL="0" indent="0">
+              <a:buNone/>
+            </a:pPr>
+            <a:endParaRPr lang="en-US" sz="2400" dirty="0">
+              <a:solidFill>
+                <a:schemeClr val="bg1"/>
+              </a:solidFill>
+              <a:latin typeface="+mj-lt"/>
+            </a:endParaRPr>
           </a:p>
         </p:txBody>
       </p:sp>
@@ -3054,21 +3162,6 @@
   <p:clrMapOvr>
     <a:masterClrMapping/>
   </p:clrMapOvr>
-  <mc:AlternateContent xmlns:mc="http://schemas.openxmlformats.org/markup-compatibility/2006">
-    <mc:Choice xmlns:p14="http://schemas.microsoft.com/office/powerpoint/2010/main" Requires="p14">
-      <p:transition p14:dur="0"/>
-    </mc:Choice>
-    <mc:Fallback>
-      <p:transition/>
-    </mc:Fallback>
-  </mc:AlternateContent>
-  <p:timing>
-    <p:tnLst>
-      <p:par>
-        <p:cTn id="1" dur="indefinite" restart="never" nodeType="tmRoot"/>
-      </p:par>
-    </p:tnLst>
-  </p:timing>
 </p:sld>
 </file>
 
@@ -3161,10 +3254,9 @@
                     <a:lstStyle/>
                     <a:p>
                       <a:r>
-                        <a:rPr lang="en-US" b="0" dirty="0" smtClean="0"/>
+                        <a:rPr lang="en-US" b="0" dirty="0"/>
                         <a:t>Architecture</a:t>
                       </a:r>
-                      <a:endParaRPr lang="en-US" b="0" dirty="0"/>
                     </a:p>
                   </a:txBody>
                   <a:tcPr/>
@@ -3175,10 +3267,9 @@
                     <a:lstStyle/>
                     <a:p>
                       <a:r>
-                        <a:rPr lang="en-US" b="0" dirty="0" smtClean="0"/>
+                        <a:rPr lang="en-US" b="0" dirty="0"/>
                         <a:t>Accuracy</a:t>
                       </a:r>
-                      <a:endParaRPr lang="en-US" b="0" dirty="0"/>
                     </a:p>
                   </a:txBody>
                   <a:tcPr/>
@@ -3196,7 +3287,7 @@
                     <a:lstStyle/>
                     <a:p>
                       <a:r>
-                        <a:rPr lang="en-US" dirty="0" smtClean="0"/>
+                        <a:rPr lang="en-US" dirty="0"/>
                         <a:t>FV+CNN</a:t>
                       </a:r>
                       <a:endParaRPr lang="en-US" b="0" dirty="0"/>
@@ -3210,7 +3301,7 @@
                     <a:lstStyle/>
                     <a:p>
                       <a:r>
-                        <a:rPr lang="en-US" dirty="0" smtClean="0"/>
+                        <a:rPr lang="en-US" dirty="0"/>
                         <a:t>75.4%</a:t>
                       </a:r>
                       <a:endParaRPr lang="en-US" b="0" dirty="0"/>
@@ -3231,7 +3322,7 @@
                     <a:lstStyle/>
                     <a:p>
                       <a:r>
-                        <a:rPr lang="en-US" dirty="0" smtClean="0"/>
+                        <a:rPr lang="en-US" dirty="0"/>
                         <a:t>FV-N+CNN+N(3D)</a:t>
                       </a:r>
                       <a:endParaRPr lang="en-US" b="0" dirty="0"/>
@@ -3245,7 +3336,7 @@
                     <a:lstStyle/>
                     <a:p>
                       <a:r>
-                        <a:rPr lang="en-US" dirty="0" smtClean="0"/>
+                        <a:rPr lang="en-US" dirty="0"/>
                         <a:t>58.3%</a:t>
                       </a:r>
                       <a:endParaRPr lang="en-US" b="0" dirty="0"/>
@@ -3266,7 +3357,7 @@
                     <a:lstStyle/>
                     <a:p>
                       <a:r>
-                        <a:rPr lang="en-US" dirty="0" smtClean="0"/>
+                        <a:rPr lang="en-US" dirty="0"/>
                         <a:t>MVCNN</a:t>
                       </a:r>
                       <a:endParaRPr lang="en-US" b="0" dirty="0"/>
@@ -3280,7 +3371,7 @@
                     <a:lstStyle/>
                     <a:p>
                       <a:r>
-                        <a:rPr lang="en-US" dirty="0" smtClean="0"/>
+                        <a:rPr lang="en-US" dirty="0"/>
                         <a:t>78.1% </a:t>
                       </a:r>
                       <a:endParaRPr lang="en-US" b="0" dirty="0"/>
@@ -3301,7 +3392,7 @@
                     <a:lstStyle/>
                     <a:p>
                       <a:r>
-                        <a:rPr lang="en-US" dirty="0" smtClean="0"/>
+                        <a:rPr lang="en-US" dirty="0"/>
                         <a:t>Multi-view DAIN (3D filter), pooling</a:t>
                       </a:r>
                       <a:endParaRPr lang="en-US" b="0" dirty="0"/>
@@ -3315,7 +3406,7 @@
                     <a:lstStyle/>
                     <a:p>
                       <a:r>
-                        <a:rPr lang="en-US" dirty="0" smtClean="0"/>
+                        <a:rPr lang="en-US" dirty="0"/>
                         <a:t>81.4% </a:t>
                       </a:r>
                       <a:endParaRPr lang="en-US" b="0" dirty="0"/>
@@ -3355,26 +3446,13 @@
           <a:lstStyle/>
           <a:p>
             <a:r>
-              <a:rPr lang="en-US" b="1" dirty="0" smtClean="0"/>
+              <a:rPr lang="en-US" b="1" dirty="0"/>
               <a:t>Table 1. </a:t>
             </a:r>
             <a:r>
               <a:rPr lang="en-US" dirty="0"/>
-              <a:t>Comparison </a:t>
-            </a:r>
-            <a:r>
-              <a:rPr lang="en-US" dirty="0" smtClean="0"/>
-              <a:t>Multi-view DAIN with </a:t>
-            </a:r>
-            <a:r>
-              <a:rPr lang="en-US" dirty="0"/>
-              <a:t>the state of art algorithms </a:t>
-            </a:r>
-            <a:r>
-              <a:rPr lang="en-US" dirty="0" smtClean="0"/>
-              <a:t>on GTOS dataset [5].</a:t>
-            </a:r>
-            <a:endParaRPr lang="en-US" dirty="0"/>
+              <a:t>Comparison Multi-view DAIN with the state of art algorithms on GTOS dataset [5].</a:t>
+            </a:r>
           </a:p>
         </p:txBody>
       </p:sp>
@@ -3388,25 +3466,18 @@
   <p:clrMapOvr>
     <a:masterClrMapping/>
   </p:clrMapOvr>
-  <mc:AlternateContent xmlns:mc="http://schemas.openxmlformats.org/markup-compatibility/2006">
-    <mc:Choice xmlns:p15="http://schemas.microsoft.com/office/powerpoint/2012/main" Requires="p15">
+  <mc:AlternateContent xmlns:mc="http://schemas.openxmlformats.org/markup-compatibility/2006" xmlns:p15="http://schemas.microsoft.com/office/powerpoint/2012/main">
+    <mc:Choice Requires="p15">
       <p:transition xmlns:p14="http://schemas.microsoft.com/office/powerpoint/2010/main" spd="slow" p14:dur="2000">
         <p15:prstTrans prst="drape"/>
       </p:transition>
     </mc:Choice>
-    <mc:Fallback>
+    <mc:Fallback xmlns="">
       <p:transition spd="slow">
         <p:fade/>
       </p:transition>
     </mc:Fallback>
   </mc:AlternateContent>
-  <p:timing>
-    <p:tnLst>
-      <p:par>
-        <p:cTn id="1" dur="indefinite" restart="never" nodeType="tmRoot"/>
-      </p:par>
-    </p:tnLst>
-  </p:timing>
 </p:sld>
 </file>
 
@@ -3492,25 +3563,18 @@
   <p:clrMapOvr>
     <a:masterClrMapping/>
   </p:clrMapOvr>
-  <mc:AlternateContent xmlns:mc="http://schemas.openxmlformats.org/markup-compatibility/2006">
-    <mc:Choice xmlns:p15="http://schemas.microsoft.com/office/powerpoint/2012/main" Requires="p15">
+  <mc:AlternateContent xmlns:mc="http://schemas.openxmlformats.org/markup-compatibility/2006" xmlns:p15="http://schemas.microsoft.com/office/powerpoint/2012/main">
+    <mc:Choice Requires="p15">
       <p:transition xmlns:p14="http://schemas.microsoft.com/office/powerpoint/2010/main" spd="slow" p14:dur="2000">
         <p15:prstTrans prst="drape"/>
       </p:transition>
     </mc:Choice>
-    <mc:Fallback>
+    <mc:Fallback xmlns="">
       <p:transition spd="slow">
         <p:fade/>
       </p:transition>
     </mc:Fallback>
   </mc:AlternateContent>
-  <p:timing>
-    <p:tnLst>
-      <p:par>
-        <p:cTn id="1" dur="indefinite" restart="never" nodeType="tmRoot"/>
-      </p:par>
-    </p:tnLst>
-  </p:timing>
 </p:sld>
 </file>
 
@@ -3780,7 +3844,7 @@
               <a:defRPr/>
             </a:pPr>
             <a:r>
-              <a:rPr lang="en-US" sz="1600" b="1" dirty="0" smtClean="0">
+              <a:rPr lang="en-US" sz="1600" b="1" dirty="0">
                 <a:solidFill>
                   <a:srgbClr val="D24726"/>
                 </a:solidFill>
@@ -3843,11 +3907,11 @@
                     <a:lstStyle/>
                     <a:p>
                       <a:r>
-                        <a:rPr lang="en-US" dirty="0" smtClean="0"/>
+                        <a:rPr lang="en-US" dirty="0"/>
                         <a:t>Train</a:t>
                       </a:r>
                       <a:r>
-                        <a:rPr lang="en-US" baseline="0" dirty="0" smtClean="0"/>
+                        <a:rPr lang="en-US" baseline="0" dirty="0"/>
                         <a:t>-test set</a:t>
                       </a:r>
                       <a:endParaRPr lang="en-US" dirty="0"/>
@@ -3861,10 +3925,9 @@
                     <a:lstStyle/>
                     <a:p>
                       <a:r>
-                        <a:rPr lang="en-US" dirty="0" smtClean="0"/>
+                        <a:rPr lang="en-US" dirty="0"/>
                         <a:t>Accuracy</a:t>
                       </a:r>
-                      <a:endParaRPr lang="en-US" dirty="0"/>
                     </a:p>
                   </a:txBody>
                   <a:tcPr/>
@@ -3882,10 +3945,9 @@
                     <a:lstStyle/>
                     <a:p>
                       <a:r>
-                        <a:rPr lang="en-US" dirty="0" smtClean="0"/>
+                        <a:rPr lang="en-US" dirty="0"/>
                         <a:t>001</a:t>
                       </a:r>
-                      <a:endParaRPr lang="en-US" dirty="0"/>
                     </a:p>
                   </a:txBody>
                   <a:tcPr/>
@@ -3896,7 +3958,7 @@
                     <a:lstStyle/>
                     <a:p>
                       <a:r>
-                        <a:rPr lang="en-US" dirty="0" smtClean="0"/>
+                        <a:rPr lang="en-US" dirty="0"/>
                         <a:t>73.17%</a:t>
                       </a:r>
                     </a:p>
@@ -3916,10 +3978,9 @@
                     <a:lstStyle/>
                     <a:p>
                       <a:r>
-                        <a:rPr lang="en-US" dirty="0" smtClean="0"/>
+                        <a:rPr lang="en-US" dirty="0"/>
                         <a:t>002</a:t>
                       </a:r>
-                      <a:endParaRPr lang="en-US" dirty="0"/>
                     </a:p>
                   </a:txBody>
                   <a:tcPr/>
@@ -3930,7 +3991,7 @@
                     <a:lstStyle/>
                     <a:p>
                       <a:r>
-                        <a:rPr lang="en-US" dirty="0" smtClean="0"/>
+                        <a:rPr lang="en-US" dirty="0"/>
                         <a:t>77.01%</a:t>
                       </a:r>
                     </a:p>
@@ -3950,10 +4011,9 @@
                     <a:lstStyle/>
                     <a:p>
                       <a:r>
-                        <a:rPr lang="en-US" dirty="0" smtClean="0"/>
+                        <a:rPr lang="en-US" dirty="0"/>
                         <a:t>003</a:t>
                       </a:r>
-                      <a:endParaRPr lang="en-US" dirty="0"/>
                     </a:p>
                   </a:txBody>
                   <a:tcPr/>
@@ -3964,7 +4024,7 @@
                     <a:lstStyle/>
                     <a:p>
                       <a:r>
-                        <a:rPr lang="en-US" dirty="0" smtClean="0"/>
+                        <a:rPr lang="en-US" dirty="0"/>
                         <a:t>77.79%</a:t>
                       </a:r>
                     </a:p>
@@ -3984,10 +4044,9 @@
                     <a:lstStyle/>
                     <a:p>
                       <a:r>
-                        <a:rPr lang="en-US" dirty="0" smtClean="0"/>
+                        <a:rPr lang="en-US" dirty="0"/>
                         <a:t>004</a:t>
                       </a:r>
-                      <a:endParaRPr lang="en-US" dirty="0"/>
                     </a:p>
                   </a:txBody>
                   <a:tcPr/>
@@ -3998,7 +4057,7 @@
                     <a:lstStyle/>
                     <a:p>
                       <a:r>
-                        <a:rPr lang="en-US" dirty="0" smtClean="0"/>
+                        <a:rPr lang="en-US" dirty="0"/>
                         <a:t>81.24%</a:t>
                       </a:r>
                     </a:p>
@@ -4018,10 +4077,9 @@
                     <a:lstStyle/>
                     <a:p>
                       <a:r>
-                        <a:rPr lang="en-US" dirty="0" smtClean="0"/>
+                        <a:rPr lang="en-US" dirty="0"/>
                         <a:t>005</a:t>
                       </a:r>
-                      <a:endParaRPr lang="en-US" dirty="0"/>
                     </a:p>
                   </a:txBody>
                   <a:tcPr/>
@@ -4032,7 +4090,7 @@
                     <a:lstStyle/>
                     <a:p>
                       <a:r>
-                        <a:rPr lang="en-US" dirty="0" smtClean="0"/>
+                        <a:rPr lang="en-US" dirty="0"/>
                         <a:t>80.44%</a:t>
                       </a:r>
                     </a:p>
@@ -4052,10 +4110,9 @@
                     <a:lstStyle/>
                     <a:p>
                       <a:r>
-                        <a:rPr lang="en-US" b="1" dirty="0" smtClean="0"/>
+                        <a:rPr lang="en-US" b="1" dirty="0"/>
                         <a:t>Average</a:t>
                       </a:r>
-                      <a:endParaRPr lang="en-US" b="1" dirty="0"/>
                     </a:p>
                   </a:txBody>
                   <a:tcPr/>
@@ -4066,10 +4123,9 @@
                     <a:lstStyle/>
                     <a:p>
                       <a:r>
-                        <a:rPr lang="en-US" dirty="0" smtClean="0"/>
+                        <a:rPr lang="en-US" dirty="0"/>
                         <a:t>77.93%</a:t>
                       </a:r>
-                      <a:endParaRPr lang="en-US" dirty="0"/>
                     </a:p>
                   </a:txBody>
                   <a:tcPr/>
@@ -4314,35 +4370,35 @@
               <a:defRPr/>
             </a:pPr>
             <a:r>
-              <a:rPr lang="en-US" sz="1400" dirty="0" smtClean="0">
+              <a:rPr lang="en-US" sz="1400" dirty="0">
                 <a:latin typeface="Segoe UI" panose="020B0502040204020203" pitchFamily="34" charset="0"/>
                 <a:cs typeface="Segoe UI" panose="020B0502040204020203" pitchFamily="34" charset="0"/>
               </a:rPr>
               <a:t>Extract VGG16-fc2 with </a:t>
             </a:r>
             <a:r>
-              <a:rPr lang="en-US" sz="1400" dirty="0" err="1" smtClean="0">
+              <a:rPr lang="en-US" sz="1400" dirty="0" err="1">
                 <a:latin typeface="Segoe UI" panose="020B0502040204020203" pitchFamily="34" charset="0"/>
                 <a:cs typeface="Segoe UI" panose="020B0502040204020203" pitchFamily="34" charset="0"/>
               </a:rPr>
               <a:t>Keras</a:t>
             </a:r>
             <a:r>
-              <a:rPr lang="en-US" sz="1400" dirty="0" smtClean="0">
+              <a:rPr lang="en-US" sz="1400" dirty="0">
                 <a:latin typeface="Segoe UI" panose="020B0502040204020203" pitchFamily="34" charset="0"/>
                 <a:cs typeface="Segoe UI" panose="020B0502040204020203" pitchFamily="34" charset="0"/>
               </a:rPr>
               <a:t> framework (using </a:t>
             </a:r>
             <a:r>
-              <a:rPr lang="en-US" sz="1400" dirty="0" err="1" smtClean="0">
+              <a:rPr lang="en-US" sz="1400" dirty="0" err="1">
                 <a:latin typeface="Segoe UI" panose="020B0502040204020203" pitchFamily="34" charset="0"/>
                 <a:cs typeface="Segoe UI" panose="020B0502040204020203" pitchFamily="34" charset="0"/>
               </a:rPr>
               <a:t>Tensorflow</a:t>
             </a:r>
             <a:r>
-              <a:rPr lang="en-US" sz="1400" dirty="0" smtClean="0">
+              <a:rPr lang="en-US" sz="1400" dirty="0">
                 <a:latin typeface="Segoe UI" panose="020B0502040204020203" pitchFamily="34" charset="0"/>
                 <a:cs typeface="Segoe UI" panose="020B0502040204020203" pitchFamily="34" charset="0"/>
               </a:rPr>
@@ -4358,27 +4414,27 @@
               <a:defRPr/>
             </a:pPr>
             <a:r>
-              <a:rPr lang="en-US" sz="1400" dirty="0" smtClean="0">
+              <a:rPr lang="en-US" sz="1400" dirty="0">
                 <a:latin typeface="Segoe UI" panose="020B0502040204020203" pitchFamily="34" charset="0"/>
                 <a:cs typeface="Segoe UI" panose="020B0502040204020203" pitchFamily="34" charset="0"/>
               </a:rPr>
               <a:t>Train with SVM (from </a:t>
             </a:r>
             <a:r>
-              <a:rPr lang="en-US" sz="1400" dirty="0" err="1" smtClean="0">
+              <a:rPr lang="en-US" sz="1400" dirty="0" err="1">
                 <a:latin typeface="Segoe UI" panose="020B0502040204020203" pitchFamily="34" charset="0"/>
                 <a:cs typeface="Segoe UI" panose="020B0502040204020203" pitchFamily="34" charset="0"/>
               </a:rPr>
               <a:t>scikit</a:t>
             </a:r>
             <a:r>
-              <a:rPr lang="en-US" sz="1400" dirty="0" smtClean="0">
+              <a:rPr lang="en-US" sz="1400" dirty="0">
                 <a:latin typeface="Segoe UI" panose="020B0502040204020203" pitchFamily="34" charset="0"/>
                 <a:cs typeface="Segoe UI" panose="020B0502040204020203" pitchFamily="34" charset="0"/>
               </a:rPr>
               <a:t>-learn python package) with my custom parameters.</a:t>
             </a:r>
-            <a:endParaRPr lang="en-US" sz="1400" i="1" dirty="0" smtClean="0">
+            <a:endParaRPr lang="en-US" sz="1400" i="1" dirty="0">
               <a:latin typeface="Segoe UI" panose="020B0502040204020203" pitchFamily="34" charset="0"/>
               <a:cs typeface="Segoe UI" panose="020B0502040204020203" pitchFamily="34" charset="0"/>
             </a:endParaRPr>
@@ -4392,13 +4448,13 @@
               <a:defRPr/>
             </a:pPr>
             <a:r>
-              <a:rPr lang="en-US" sz="1400" dirty="0" smtClean="0">
+              <a:rPr lang="en-US" sz="1400" dirty="0">
                 <a:latin typeface="Segoe UI" panose="020B0502040204020203" pitchFamily="34" charset="0"/>
                 <a:cs typeface="Segoe UI" panose="020B0502040204020203" pitchFamily="34" charset="0"/>
               </a:rPr>
               <a:t>Test on 5 different train-test set (same as the original paper).</a:t>
             </a:r>
-            <a:endParaRPr lang="en-US" sz="1400" dirty="0" smtClean="0"/>
+            <a:endParaRPr lang="en-US" sz="1400" dirty="0"/>
           </a:p>
         </p:txBody>
       </p:sp>
@@ -4424,14 +4480,13 @@
           <a:lstStyle/>
           <a:p>
             <a:r>
-              <a:rPr lang="en-US" sz="1400" b="1" dirty="0" smtClean="0"/>
+              <a:rPr lang="en-US" sz="1400" b="1" dirty="0"/>
               <a:t>Table 1. </a:t>
             </a:r>
             <a:r>
-              <a:rPr lang="en-US" sz="1400" dirty="0" smtClean="0"/>
+              <a:rPr lang="en-US" sz="1400" dirty="0"/>
               <a:t>VGG-16(fc2) – SVM result on GTOS</a:t>
             </a:r>
-            <a:endParaRPr lang="en-US" sz="1400" dirty="0"/>
           </a:p>
         </p:txBody>
       </p:sp>
@@ -4445,25 +4500,18 @@
   <p:clrMapOvr>
     <a:masterClrMapping/>
   </p:clrMapOvr>
-  <mc:AlternateContent xmlns:mc="http://schemas.openxmlformats.org/markup-compatibility/2006">
-    <mc:Choice xmlns:p15="http://schemas.microsoft.com/office/powerpoint/2012/main" Requires="p15">
+  <mc:AlternateContent xmlns:mc="http://schemas.openxmlformats.org/markup-compatibility/2006" xmlns:p15="http://schemas.microsoft.com/office/powerpoint/2012/main">
+    <mc:Choice Requires="p15">
       <p:transition xmlns:p14="http://schemas.microsoft.com/office/powerpoint/2010/main" spd="slow" p14:dur="2000">
         <p15:prstTrans prst="drape"/>
       </p:transition>
     </mc:Choice>
-    <mc:Fallback>
+    <mc:Fallback xmlns="">
       <p:transition spd="slow">
         <p:fade/>
       </p:transition>
     </mc:Fallback>
   </mc:AlternateContent>
-  <p:timing>
-    <p:tnLst>
-      <p:par>
-        <p:cTn id="1" dur="indefinite" restart="never" nodeType="tmRoot"/>
-      </p:par>
-    </p:tnLst>
-  </p:timing>
 </p:sld>
 </file>
 
@@ -4503,16 +4551,12 @@
           <a:p>
             <a:pPr lvl="0"/>
             <a:r>
-              <a:rPr lang="en-US" dirty="0" smtClean="0">
+              <a:rPr lang="en-US" dirty="0">
                 <a:latin typeface="Segoe UI Light" panose="020B0502040204020203" pitchFamily="34" charset="0"/>
                 <a:cs typeface="Segoe UI Light" panose="020B0502040204020203" pitchFamily="34" charset="0"/>
               </a:rPr>
               <a:t>What’s next?</a:t>
             </a:r>
-            <a:endParaRPr lang="en-US" dirty="0">
-              <a:latin typeface="Segoe UI Light" panose="020B0502040204020203" pitchFamily="34" charset="0"/>
-              <a:cs typeface="Segoe UI Light" panose="020B0502040204020203" pitchFamily="34" charset="0"/>
-            </a:endParaRPr>
           </a:p>
         </p:txBody>
       </p:sp>
@@ -4835,7 +4879,7 @@
             <a:p>
               <a:pPr algn="ctr"/>
               <a:r>
-                <a:rPr lang="en-US" dirty="0" smtClean="0">
+                <a:rPr lang="en-US" dirty="0">
                   <a:solidFill>
                     <a:schemeClr val="bg1"/>
                   </a:solidFill>
@@ -4844,13 +4888,6 @@
                 </a:rPr>
                 <a:t>1</a:t>
               </a:r>
-              <a:endParaRPr lang="en-US" dirty="0">
-                <a:solidFill>
-                  <a:schemeClr val="bg1"/>
-                </a:solidFill>
-                <a:latin typeface="Segoe UI Semibold" panose="020B0702040204020203" pitchFamily="34" charset="0"/>
-                <a:cs typeface="Segoe UI Semibold" panose="020B0702040204020203" pitchFamily="34" charset="0"/>
-              </a:endParaRPr>
             </a:p>
           </p:txBody>
         </p:sp>
@@ -5078,7 +5115,7 @@
               <a:buNone/>
             </a:pPr>
             <a:r>
-              <a:rPr lang="en-US" sz="1400" dirty="0" smtClean="0">
+              <a:rPr lang="en-US" sz="1400" dirty="0">
                 <a:solidFill>
                   <a:prstClr val="black">
                     <a:lumMod val="75000"/>
@@ -5090,16 +5127,6 @@
               </a:rPr>
               <a:t>Prediction combined with SVM instead of combining final layer of CNN </a:t>
             </a:r>
-            <a:endParaRPr lang="en-US" sz="1400" dirty="0">
-              <a:solidFill>
-                <a:prstClr val="black">
-                  <a:lumMod val="75000"/>
-                  <a:lumOff val="25000"/>
-                </a:prstClr>
-              </a:solidFill>
-              <a:latin typeface="Segoe UI" panose="020B0502040204020203" pitchFamily="34" charset="0"/>
-              <a:cs typeface="Segoe UI" panose="020B0502040204020203" pitchFamily="34" charset="0"/>
-            </a:endParaRPr>
           </a:p>
         </p:txBody>
       </p:sp>
@@ -5161,13 +5188,13 @@
   <p:clrMapOvr>
     <a:masterClrMapping/>
   </p:clrMapOvr>
-  <mc:AlternateContent xmlns:mc="http://schemas.openxmlformats.org/markup-compatibility/2006">
-    <mc:Choice xmlns:p15="http://schemas.microsoft.com/office/powerpoint/2012/main" Requires="p15">
+  <mc:AlternateContent xmlns:mc="http://schemas.openxmlformats.org/markup-compatibility/2006" xmlns:p15="http://schemas.microsoft.com/office/powerpoint/2012/main">
+    <mc:Choice Requires="p15">
       <p:transition xmlns:p14="http://schemas.microsoft.com/office/powerpoint/2010/main" spd="slow" p14:dur="2000">
         <p15:prstTrans prst="drape"/>
       </p:transition>
     </mc:Choice>
-    <mc:Fallback>
+    <mc:Fallback xmlns="">
       <p:transition spd="slow">
         <p:fade/>
       </p:transition>
@@ -5518,13 +5545,6 @@
                 </a:rPr>
                 <a:t>2</a:t>
               </a:r>
-              <a:endParaRPr lang="en-US" dirty="0">
-                <a:solidFill>
-                  <a:schemeClr val="bg1"/>
-                </a:solidFill>
-                <a:latin typeface="Segoe UI Semibold" panose="020B0702040204020203" pitchFamily="34" charset="0"/>
-                <a:cs typeface="Segoe UI Semibold" panose="020B0702040204020203" pitchFamily="34" charset="0"/>
-              </a:endParaRPr>
             </a:p>
           </p:txBody>
         </p:sp>
@@ -5752,7 +5772,7 @@
               <a:buNone/>
             </a:pPr>
             <a:r>
-              <a:rPr lang="en-US" sz="1400" dirty="0" smtClean="0">
+              <a:rPr lang="en-US" sz="1400" dirty="0">
                 <a:solidFill>
                   <a:prstClr val="black">
                     <a:lumMod val="75000"/>
@@ -5764,16 +5784,6 @@
               </a:rPr>
               <a:t>Feature combined with SVM instead of combining intermedia layer of CNN </a:t>
             </a:r>
-            <a:endParaRPr lang="en-US" sz="1400" dirty="0">
-              <a:solidFill>
-                <a:prstClr val="black">
-                  <a:lumMod val="75000"/>
-                  <a:lumOff val="25000"/>
-                </a:prstClr>
-              </a:solidFill>
-              <a:latin typeface="Segoe UI" panose="020B0502040204020203" pitchFamily="34" charset="0"/>
-              <a:cs typeface="Segoe UI" panose="020B0502040204020203" pitchFamily="34" charset="0"/>
-            </a:endParaRPr>
           </a:p>
         </p:txBody>
       </p:sp>
@@ -5787,25 +5797,18 @@
   <p:clrMapOvr>
     <a:masterClrMapping/>
   </p:clrMapOvr>
-  <mc:AlternateContent xmlns:mc="http://schemas.openxmlformats.org/markup-compatibility/2006">
-    <mc:Choice xmlns:p15="http://schemas.microsoft.com/office/powerpoint/2012/main" Requires="p15">
+  <mc:AlternateContent xmlns:mc="http://schemas.openxmlformats.org/markup-compatibility/2006" xmlns:p15="http://schemas.microsoft.com/office/powerpoint/2012/main">
+    <mc:Choice Requires="p15">
       <p:transition xmlns:p14="http://schemas.microsoft.com/office/powerpoint/2010/main" spd="slow" p14:dur="2000">
         <p15:prstTrans prst="drape"/>
       </p:transition>
     </mc:Choice>
-    <mc:Fallback>
+    <mc:Fallback xmlns="">
       <p:transition spd="slow">
         <p:fade/>
       </p:transition>
     </mc:Fallback>
   </mc:AlternateContent>
-  <p:timing>
-    <p:tnLst>
-      <p:par>
-        <p:cTn id="1" dur="indefinite" restart="never" nodeType="tmRoot"/>
-      </p:par>
-    </p:tnLst>
-  </p:timing>
 </p:sld>
 </file>
 
@@ -6395,25 +6398,18 @@
   <p:clrMapOvr>
     <a:masterClrMapping/>
   </p:clrMapOvr>
-  <mc:AlternateContent xmlns:mc="http://schemas.openxmlformats.org/markup-compatibility/2006">
-    <mc:Choice xmlns:p15="http://schemas.microsoft.com/office/powerpoint/2012/main" Requires="p15">
+  <mc:AlternateContent xmlns:mc="http://schemas.openxmlformats.org/markup-compatibility/2006" xmlns:p15="http://schemas.microsoft.com/office/powerpoint/2012/main">
+    <mc:Choice Requires="p15">
       <p:transition xmlns:p14="http://schemas.microsoft.com/office/powerpoint/2010/main" spd="slow" p14:dur="2000">
         <p15:prstTrans prst="drape"/>
       </p:transition>
     </mc:Choice>
-    <mc:Fallback>
+    <mc:Fallback xmlns="">
       <p:transition spd="slow">
         <p:fade/>
       </p:transition>
     </mc:Fallback>
   </mc:AlternateContent>
-  <p:timing>
-    <p:tnLst>
-      <p:par>
-        <p:cTn id="1" dur="indefinite" restart="never" nodeType="tmRoot"/>
-      </p:par>
-    </p:tnLst>
-  </p:timing>
 </p:sld>
 </file>
 
@@ -6493,14 +6489,14 @@
               <a:buNone/>
             </a:pPr>
             <a:r>
-              <a:rPr lang="en-US" sz="2000" dirty="0" smtClean="0">
+              <a:rPr lang="en-US" sz="2000" dirty="0">
                 <a:latin typeface="Segoe UI Light" panose="020B0502040204020203" pitchFamily="34" charset="0"/>
                 <a:cs typeface="Segoe UI Light" panose="020B0502040204020203" pitchFamily="34" charset="0"/>
               </a:rPr>
               <a:t>For more detail please email me at </a:t>
             </a:r>
             <a:r>
-              <a:rPr lang="en-US" sz="2000" b="1" dirty="0" smtClean="0">
+              <a:rPr lang="en-US" sz="2000" b="1" dirty="0">
                 <a:solidFill>
                   <a:srgbClr val="D24726"/>
                 </a:solidFill>
@@ -6540,7 +6536,7 @@
               <a:buNone/>
             </a:pPr>
             <a:r>
-              <a:rPr lang="en-US" sz="2000" b="1" u="sng" dirty="0" smtClean="0">
+              <a:rPr lang="en-US" sz="2000" b="1" u="sng" dirty="0">
                 <a:solidFill>
                   <a:schemeClr val="accent1">
                     <a:lumMod val="75000"/>
@@ -6576,7 +6572,7 @@
               <a:buNone/>
             </a:pPr>
             <a:r>
-              <a:rPr lang="en-US" sz="2000" b="1" u="sng" dirty="0" smtClean="0">
+              <a:rPr lang="en-US" sz="2000" b="1" u="sng" dirty="0">
                 <a:solidFill>
                   <a:schemeClr val="accent1">
                     <a:lumMod val="75000"/>
@@ -6588,7 +6584,7 @@
               </a:rPr>
               <a:t>Interested in my work, you can find it here</a:t>
             </a:r>
-            <a:endParaRPr lang="en-US" sz="2000" b="1" u="sng" dirty="0" smtClean="0">
+            <a:endParaRPr lang="en-US" sz="2000" b="1" u="sng" dirty="0">
               <a:solidFill>
                 <a:schemeClr val="accent1">
                   <a:lumMod val="75000"/>
@@ -6612,7 +6608,7 @@
               <a:buNone/>
             </a:pPr>
             <a:r>
-              <a:rPr lang="en-US" sz="2000" b="1" u="sng" dirty="0" smtClean="0">
+              <a:rPr lang="en-US" sz="2000" b="1" u="sng" dirty="0">
                 <a:solidFill>
                   <a:schemeClr val="accent1">
                     <a:lumMod val="75000"/>
@@ -6625,7 +6621,7 @@
               <a:t>Give feedback about this </a:t>
             </a:r>
             <a:r>
-              <a:rPr lang="en-US" sz="2000" b="1" u="sng" dirty="0" smtClean="0">
+              <a:rPr lang="en-US" sz="2000" b="1" u="sng" dirty="0">
                 <a:solidFill>
                   <a:schemeClr val="accent1">
                     <a:lumMod val="75000"/>
@@ -6787,13 +6783,6 @@
       </p:transition>
     </mc:Fallback>
   </mc:AlternateContent>
-  <p:timing>
-    <p:tnLst>
-      <p:par>
-        <p:cTn id="1" dur="indefinite" restart="never" nodeType="tmRoot"/>
-      </p:par>
-    </p:tnLst>
-  </p:timing>
 </p:sld>
 </file>
 
@@ -7167,25 +7156,18 @@
   <p:clrMapOvr>
     <a:masterClrMapping/>
   </p:clrMapOvr>
-  <mc:AlternateContent xmlns:mc="http://schemas.openxmlformats.org/markup-compatibility/2006">
-    <mc:Choice xmlns:p15="http://schemas.microsoft.com/office/powerpoint/2012/main" Requires="p15">
+  <mc:AlternateContent xmlns:mc="http://schemas.openxmlformats.org/markup-compatibility/2006" xmlns:p15="http://schemas.microsoft.com/office/powerpoint/2012/main">
+    <mc:Choice Requires="p15">
       <p:transition xmlns:p14="http://schemas.microsoft.com/office/powerpoint/2010/main" spd="slow" p14:dur="2000">
         <p15:prstTrans prst="drape"/>
       </p:transition>
     </mc:Choice>
-    <mc:Fallback>
+    <mc:Fallback xmlns="">
       <p:transition spd="slow">
         <p:fade/>
       </p:transition>
     </mc:Fallback>
   </mc:AlternateContent>
-  <p:timing>
-    <p:tnLst>
-      <p:par>
-        <p:cTn id="1" dur="indefinite" restart="never" nodeType="tmRoot"/>
-      </p:par>
-    </p:tnLst>
-  </p:timing>
 </p:sld>
 </file>
 
@@ -9683,25 +9665,18 @@
   <p:clrMapOvr>
     <a:masterClrMapping/>
   </p:clrMapOvr>
-  <mc:AlternateContent xmlns:mc="http://schemas.openxmlformats.org/markup-compatibility/2006">
-    <mc:Choice xmlns:p15="http://schemas.microsoft.com/office/powerpoint/2012/main" Requires="p15">
+  <mc:AlternateContent xmlns:mc="http://schemas.openxmlformats.org/markup-compatibility/2006" xmlns:p15="http://schemas.microsoft.com/office/powerpoint/2012/main">
+    <mc:Choice Requires="p15">
       <p:transition xmlns:p14="http://schemas.microsoft.com/office/powerpoint/2010/main" spd="slow" p14:dur="2000">
         <p15:prstTrans prst="drape"/>
       </p:transition>
     </mc:Choice>
-    <mc:Fallback>
+    <mc:Fallback xmlns="">
       <p:transition spd="slow">
         <p:fade/>
       </p:transition>
     </mc:Fallback>
   </mc:AlternateContent>
-  <p:timing>
-    <p:tnLst>
-      <p:par>
-        <p:cTn id="1" dur="indefinite" restart="never" nodeType="tmRoot"/>
-      </p:par>
-    </p:tnLst>
-  </p:timing>
 </p:sld>
 </file>
 
@@ -10417,13 +10392,13 @@
   <p:clrMapOvr>
     <a:masterClrMapping/>
   </p:clrMapOvr>
-  <mc:AlternateContent xmlns:mc="http://schemas.openxmlformats.org/markup-compatibility/2006">
-    <mc:Choice xmlns:p15="http://schemas.microsoft.com/office/powerpoint/2012/main" Requires="p15">
+  <mc:AlternateContent xmlns:mc="http://schemas.openxmlformats.org/markup-compatibility/2006" xmlns:p15="http://schemas.microsoft.com/office/powerpoint/2012/main">
+    <mc:Choice Requires="p15">
       <p:transition xmlns:p14="http://schemas.microsoft.com/office/powerpoint/2010/main" spd="slow" p14:dur="2000">
         <p15:prstTrans prst="drape"/>
       </p:transition>
     </mc:Choice>
-    <mc:Fallback>
+    <mc:Fallback xmlns="">
       <p:transition spd="slow">
         <p:fade/>
       </p:transition>
@@ -11442,7 +11417,7 @@
               <a:t>Figure 1. </a:t>
             </a:r>
             <a:r>
-              <a:rPr lang="en-US" sz="1400" dirty="0" smtClean="0">
+              <a:rPr lang="en-US" sz="1400" dirty="0">
                 <a:solidFill>
                   <a:srgbClr val="131413"/>
                 </a:solidFill>
@@ -11463,13 +11438,13 @@
   <p:clrMapOvr>
     <a:masterClrMapping/>
   </p:clrMapOvr>
-  <mc:AlternateContent xmlns:mc="http://schemas.openxmlformats.org/markup-compatibility/2006">
-    <mc:Choice xmlns:p15="http://schemas.microsoft.com/office/powerpoint/2012/main" Requires="p15">
+  <mc:AlternateContent xmlns:mc="http://schemas.openxmlformats.org/markup-compatibility/2006" xmlns:p15="http://schemas.microsoft.com/office/powerpoint/2012/main">
+    <mc:Choice Requires="p15">
       <p:transition xmlns:p14="http://schemas.microsoft.com/office/powerpoint/2010/main" spd="slow" p14:dur="2000">
         <p15:prstTrans prst="drape"/>
       </p:transition>
     </mc:Choice>
-    <mc:Fallback>
+    <mc:Fallback xmlns="">
       <p:transition spd="slow">
         <p:fade/>
       </p:transition>
@@ -12511,13 +12486,13 @@
   <p:clrMapOvr>
     <a:masterClrMapping/>
   </p:clrMapOvr>
-  <mc:AlternateContent xmlns:mc="http://schemas.openxmlformats.org/markup-compatibility/2006">
-    <mc:Choice xmlns:p15="http://schemas.microsoft.com/office/powerpoint/2012/main" Requires="p15">
+  <mc:AlternateContent xmlns:mc="http://schemas.openxmlformats.org/markup-compatibility/2006" xmlns:p15="http://schemas.microsoft.com/office/powerpoint/2012/main">
+    <mc:Choice Requires="p15">
       <p:transition xmlns:p14="http://schemas.microsoft.com/office/powerpoint/2010/main" spd="slow" p14:dur="2000">
         <p15:prstTrans prst="drape"/>
       </p:transition>
     </mc:Choice>
-    <mc:Fallback>
+    <mc:Fallback xmlns="">
       <p:transition spd="slow">
         <p:fade/>
       </p:transition>
@@ -12820,25 +12795,18 @@
   <p:clrMapOvr>
     <a:masterClrMapping/>
   </p:clrMapOvr>
-  <mc:AlternateContent xmlns:mc="http://schemas.openxmlformats.org/markup-compatibility/2006">
-    <mc:Choice xmlns:p15="http://schemas.microsoft.com/office/powerpoint/2012/main" Requires="p15">
+  <mc:AlternateContent xmlns:mc="http://schemas.openxmlformats.org/markup-compatibility/2006" xmlns:p15="http://schemas.microsoft.com/office/powerpoint/2012/main">
+    <mc:Choice Requires="p15">
       <p:transition xmlns:p14="http://schemas.microsoft.com/office/powerpoint/2010/main" spd="slow" p14:dur="2000">
         <p15:prstTrans prst="drape"/>
       </p:transition>
     </mc:Choice>
-    <mc:Fallback>
+    <mc:Fallback xmlns="">
       <p:transition spd="slow">
         <p:fade/>
       </p:transition>
     </mc:Fallback>
   </mc:AlternateContent>
-  <p:timing>
-    <p:tnLst>
-      <p:par>
-        <p:cTn id="1" dur="indefinite" restart="never" nodeType="tmRoot"/>
-      </p:par>
-    </p:tnLst>
-  </p:timing>
 </p:sld>
 </file>
 
@@ -14097,25 +14065,18 @@
   <p:clrMapOvr>
     <a:masterClrMapping/>
   </p:clrMapOvr>
-  <mc:AlternateContent xmlns:mc="http://schemas.openxmlformats.org/markup-compatibility/2006">
-    <mc:Choice xmlns:p15="http://schemas.microsoft.com/office/powerpoint/2012/main" Requires="p15">
+  <mc:AlternateContent xmlns:mc="http://schemas.openxmlformats.org/markup-compatibility/2006" xmlns:p15="http://schemas.microsoft.com/office/powerpoint/2012/main">
+    <mc:Choice Requires="p15">
       <p:transition xmlns:p14="http://schemas.microsoft.com/office/powerpoint/2010/main" spd="slow" p14:dur="2000">
         <p15:prstTrans prst="drape"/>
       </p:transition>
     </mc:Choice>
-    <mc:Fallback>
+    <mc:Fallback xmlns="">
       <p:transition spd="slow">
         <p:fade/>
       </p:transition>
     </mc:Fallback>
   </mc:AlternateContent>
-  <p:timing>
-    <p:tnLst>
-      <p:par>
-        <p:cTn id="1" dur="indefinite" restart="never" nodeType="tmRoot"/>
-      </p:par>
-    </p:tnLst>
-  </p:timing>
 </p:sld>
 </file>
 
@@ -14385,7 +14346,7 @@
               <a:defRPr/>
             </a:pPr>
             <a:r>
-              <a:rPr lang="en-US" sz="1600" b="1" dirty="0" smtClean="0">
+              <a:rPr lang="en-US" sz="1600" b="1" dirty="0">
                 <a:solidFill>
                   <a:srgbClr val="D24726"/>
                 </a:solidFill>
@@ -14631,7 +14592,7 @@
               <a:defRPr/>
             </a:pPr>
             <a:r>
-              <a:rPr lang="en-US" sz="1400" dirty="0" smtClean="0">
+              <a:rPr lang="en-US" sz="1400" dirty="0">
                 <a:solidFill>
                   <a:srgbClr val="D24726"/>
                 </a:solidFill>
@@ -14641,25 +14602,11 @@
               <a:t>Name</a:t>
             </a:r>
             <a:r>
-              <a:rPr lang="en-US" sz="1400" dirty="0" smtClean="0">
-                <a:latin typeface="Segoe UI" panose="020B0502040204020203" pitchFamily="34" charset="0"/>
-                <a:cs typeface="Segoe UI" panose="020B0502040204020203" pitchFamily="34" charset="0"/>
-              </a:rPr>
-              <a:t> </a:t>
-            </a:r>
-            <a:r>
               <a:rPr lang="en-US" sz="1400" dirty="0">
                 <a:latin typeface="Segoe UI" panose="020B0502040204020203" pitchFamily="34" charset="0"/>
                 <a:cs typeface="Segoe UI" panose="020B0502040204020203" pitchFamily="34" charset="0"/>
               </a:rPr>
-              <a:t>Differential Angular Imaging for Material </a:t>
-            </a:r>
-            <a:r>
-              <a:rPr lang="en-US" sz="1400" dirty="0" smtClean="0">
-                <a:latin typeface="Segoe UI" panose="020B0502040204020203" pitchFamily="34" charset="0"/>
-                <a:cs typeface="Segoe UI" panose="020B0502040204020203" pitchFamily="34" charset="0"/>
-              </a:rPr>
-              <a:t>Recognition (DAIN)</a:t>
+              <a:t> Differential Angular Imaging for Material Recognition (DAIN)</a:t>
             </a:r>
           </a:p>
           <a:p>
@@ -14671,7 +14618,7 @@
               <a:defRPr/>
             </a:pPr>
             <a:r>
-              <a:rPr lang="en-US" sz="1400" dirty="0" smtClean="0">
+              <a:rPr lang="en-US" sz="1400" dirty="0">
                 <a:solidFill>
                   <a:srgbClr val="D24726"/>
                 </a:solidFill>
@@ -14681,25 +14628,11 @@
               <a:t>Dataset</a:t>
             </a:r>
             <a:r>
-              <a:rPr lang="en-US" sz="1400" dirty="0" smtClean="0">
-                <a:latin typeface="Segoe UI" panose="020B0502040204020203" pitchFamily="34" charset="0"/>
-                <a:cs typeface="Segoe UI" panose="020B0502040204020203" pitchFamily="34" charset="0"/>
-              </a:rPr>
-              <a:t> GTOS </a:t>
-            </a:r>
-            <a:r>
               <a:rPr lang="en-US" sz="1400" dirty="0">
                 <a:latin typeface="Segoe UI" panose="020B0502040204020203" pitchFamily="34" charset="0"/>
                 <a:cs typeface="Segoe UI" panose="020B0502040204020203" pitchFamily="34" charset="0"/>
               </a:rPr>
-              <a:t>(Ground Terrain in Outdoor Scenes</a:t>
-            </a:r>
-            <a:r>
-              <a:rPr lang="en-US" sz="1400" dirty="0" smtClean="0">
-                <a:latin typeface="Segoe UI" panose="020B0502040204020203" pitchFamily="34" charset="0"/>
-                <a:cs typeface="Segoe UI" panose="020B0502040204020203" pitchFamily="34" charset="0"/>
-              </a:rPr>
-              <a:t>).</a:t>
+              <a:t> GTOS (Ground Terrain in Outdoor Scenes).</a:t>
             </a:r>
           </a:p>
           <a:p>
@@ -14711,7 +14644,7 @@
               <a:defRPr/>
             </a:pPr>
             <a:r>
-              <a:rPr lang="en-US" sz="1400" dirty="0" smtClean="0">
+              <a:rPr lang="en-US" sz="1400" dirty="0">
                 <a:solidFill>
                   <a:srgbClr val="D24726"/>
                 </a:solidFill>
@@ -14721,7 +14654,7 @@
               <a:t>Authors</a:t>
             </a:r>
             <a:r>
-              <a:rPr lang="en-US" sz="1400" dirty="0" smtClean="0">
+              <a:rPr lang="en-US" sz="1400" dirty="0">
                 <a:latin typeface="Segoe UI" panose="020B0502040204020203" pitchFamily="34" charset="0"/>
                 <a:cs typeface="Segoe UI" panose="020B0502040204020203" pitchFamily="34" charset="0"/>
               </a:rPr>
@@ -14742,74 +14675,50 @@
               <a:t> </a:t>
             </a:r>
             <a:r>
-              <a:rPr lang="en-US" sz="1400" dirty="0" err="1" smtClean="0">
+              <a:rPr lang="en-US" sz="1400" dirty="0" err="1">
                 <a:latin typeface="Segoe UI" panose="020B0502040204020203" pitchFamily="34" charset="0"/>
                 <a:cs typeface="Segoe UI" panose="020B0502040204020203" pitchFamily="34" charset="0"/>
               </a:rPr>
               <a:t>Xue</a:t>
             </a:r>
             <a:r>
-              <a:rPr lang="en-US" sz="1400" dirty="0" smtClean="0">
+              <a:rPr lang="en-US" sz="1400" dirty="0">
                 <a:latin typeface="Segoe UI" panose="020B0502040204020203" pitchFamily="34" charset="0"/>
                 <a:cs typeface="Segoe UI" panose="020B0502040204020203" pitchFamily="34" charset="0"/>
               </a:rPr>
               <a:t>, Hang Zhang, Kristin Dana, </a:t>
             </a:r>
             <a:r>
-              <a:rPr lang="en-US" sz="1400" dirty="0" err="1" smtClean="0">
+              <a:rPr lang="en-US" sz="1400" dirty="0" err="1">
                 <a:latin typeface="Segoe UI" panose="020B0502040204020203" pitchFamily="34" charset="0"/>
                 <a:cs typeface="Segoe UI" panose="020B0502040204020203" pitchFamily="34" charset="0"/>
               </a:rPr>
               <a:t>Ko</a:t>
             </a:r>
             <a:r>
-              <a:rPr lang="en-US" sz="1400" dirty="0" smtClean="0">
+              <a:rPr lang="en-US" sz="1400" dirty="0">
                 <a:latin typeface="Segoe UI" panose="020B0502040204020203" pitchFamily="34" charset="0"/>
                 <a:cs typeface="Segoe UI" panose="020B0502040204020203" pitchFamily="34" charset="0"/>
               </a:rPr>
               <a:t> Nishino </a:t>
             </a:r>
             <a:r>
-              <a:rPr lang="en-US" sz="1400" i="1" dirty="0" smtClean="0">
+              <a:rPr lang="en-US" sz="1400" i="1" dirty="0">
                 <a:latin typeface="Segoe UI" panose="020B0502040204020203" pitchFamily="34" charset="0"/>
                 <a:cs typeface="Segoe UI" panose="020B0502040204020203" pitchFamily="34" charset="0"/>
               </a:rPr>
               <a:t>from</a:t>
             </a:r>
             <a:r>
-              <a:rPr lang="en-US" sz="1400" dirty="0" smtClean="0">
+              <a:rPr lang="en-US" sz="1400" dirty="0">
                 <a:latin typeface="Segoe UI" panose="020B0502040204020203" pitchFamily="34" charset="0"/>
                 <a:cs typeface="Segoe UI" panose="020B0502040204020203" pitchFamily="34" charset="0"/>
               </a:rPr>
               <a:t> </a:t>
             </a:r>
             <a:r>
-              <a:rPr lang="en-US" sz="1400" i="1" dirty="0" smtClean="0"/>
-              <a:t>Computer </a:t>
-            </a:r>
-            <a:r>
               <a:rPr lang="en-US" sz="1400" i="1" dirty="0"/>
-              <a:t>Vision Lab, Rutgers </a:t>
-            </a:r>
-            <a:r>
-              <a:rPr lang="en-US" sz="1400" i="1" dirty="0" smtClean="0"/>
-              <a:t>University</a:t>
-            </a:r>
-            <a:r>
-              <a:rPr lang="en-US" sz="1400" i="1" dirty="0"/>
-              <a:t> </a:t>
-            </a:r>
-            <a:r>
-              <a:rPr lang="en-US" sz="1400" i="1" dirty="0" smtClean="0"/>
-              <a:t>- </a:t>
-            </a:r>
-            <a:r>
-              <a:rPr lang="en-US" sz="1400" i="1" dirty="0"/>
-              <a:t>New </a:t>
-            </a:r>
-            <a:r>
-              <a:rPr lang="en-US" sz="1400" i="1" dirty="0" smtClean="0"/>
-              <a:t>Jersey (USA).</a:t>
+              <a:t>Computer Vision Lab, Rutgers University - New Jersey (USA).</a:t>
             </a:r>
           </a:p>
           <a:p>
@@ -14833,22 +14742,10 @@
               <a:t> </a:t>
             </a:r>
             <a:r>
-              <a:rPr lang="en-US" sz="1400" i="1" dirty="0" smtClean="0">
-                <a:hlinkClick r:id="rId2"/>
-              </a:rPr>
-              <a:t>http</a:t>
-            </a:r>
-            <a:r>
               <a:rPr lang="en-US" sz="1400" i="1" dirty="0">
                 <a:hlinkClick r:id="rId2"/>
               </a:rPr>
-              <a:t>://</a:t>
-            </a:r>
-            <a:r>
-              <a:rPr lang="en-US" sz="1400" i="1" dirty="0" smtClean="0">
-                <a:hlinkClick r:id="rId2"/>
-              </a:rPr>
-              <a:t>eceweb1.rutgers.edu/vision/index.html</a:t>
+              <a:t>http://eceweb1.rutgers.edu/vision/index.html</a:t>
             </a:r>
             <a:endParaRPr lang="en-US" sz="1400" i="1" dirty="0"/>
           </a:p>
@@ -14905,7 +14802,7 @@
           <a:effectLst/>
           <a:extLst>
             <a:ext uri="{C572A759-6A51-4108-AA02-DFA0A04FC94B}">
-              <ma14:wrappingTextBoxFlag xmlns="" xmlns:ma14="http://schemas.microsoft.com/office/mac/drawingml/2011/main"/>
+              <ma14:wrappingTextBoxFlag xmlns:ma14="http://schemas.microsoft.com/office/mac/drawingml/2011/main" xmlns=""/>
             </a:ext>
           </a:extLst>
         </p:spPr>
@@ -14994,25 +14891,18 @@
   <p:clrMapOvr>
     <a:masterClrMapping/>
   </p:clrMapOvr>
-  <mc:AlternateContent xmlns:mc="http://schemas.openxmlformats.org/markup-compatibility/2006">
-    <mc:Choice xmlns:p15="http://schemas.microsoft.com/office/powerpoint/2012/main" Requires="p15">
+  <mc:AlternateContent xmlns:mc="http://schemas.openxmlformats.org/markup-compatibility/2006" xmlns:p15="http://schemas.microsoft.com/office/powerpoint/2012/main">
+    <mc:Choice Requires="p15">
       <p:transition xmlns:p14="http://schemas.microsoft.com/office/powerpoint/2010/main" spd="slow" p14:dur="2000">
         <p15:prstTrans prst="drape"/>
       </p:transition>
     </mc:Choice>
-    <mc:Fallback>
+    <mc:Fallback xmlns="">
       <p:transition spd="slow">
         <p:fade/>
       </p:transition>
     </mc:Fallback>
   </mc:AlternateContent>
-  <p:timing>
-    <p:tnLst>
-      <p:par>
-        <p:cTn id="1" dur="indefinite" restart="never" nodeType="tmRoot"/>
-      </p:par>
-    </p:tnLst>
-  </p:timing>
 </p:sld>
 </file>
 
@@ -15282,7 +15172,7 @@
               <a:defRPr/>
             </a:pPr>
             <a:r>
-              <a:rPr lang="en-US" sz="1600" b="1" dirty="0" smtClean="0">
+              <a:rPr lang="en-US" sz="1600" b="1" dirty="0">
                 <a:solidFill>
                   <a:srgbClr val="D24726"/>
                 </a:solidFill>
@@ -15528,7 +15418,7 @@
               <a:defRPr/>
             </a:pPr>
             <a:r>
-              <a:rPr lang="en-US" sz="1400" dirty="0" smtClean="0">
+              <a:rPr lang="en-US" sz="1400" dirty="0">
                 <a:solidFill>
                   <a:srgbClr val="D24726"/>
                 </a:solidFill>
@@ -15538,7 +15428,7 @@
               <a:t>Newest</a:t>
             </a:r>
             <a:r>
-              <a:rPr lang="en-US" sz="1400" dirty="0" smtClean="0">
+              <a:rPr lang="en-US" sz="1400" dirty="0">
                 <a:latin typeface="Segoe UI" panose="020B0502040204020203" pitchFamily="34" charset="0"/>
                 <a:cs typeface="Segoe UI" panose="020B0502040204020203" pitchFamily="34" charset="0"/>
               </a:rPr>
@@ -15554,14 +15444,14 @@
               <a:defRPr/>
             </a:pPr>
             <a:r>
-              <a:rPr lang="en-US" sz="1400" dirty="0" smtClean="0">
+              <a:rPr lang="en-US" sz="1400" dirty="0">
                 <a:latin typeface="Segoe UI" panose="020B0502040204020203" pitchFamily="34" charset="0"/>
                 <a:cs typeface="Segoe UI" panose="020B0502040204020203" pitchFamily="34" charset="0"/>
               </a:rPr>
               <a:t>Work with a </a:t>
             </a:r>
             <a:r>
-              <a:rPr lang="en-US" sz="1400" dirty="0" smtClean="0">
+              <a:rPr lang="en-US" sz="1400" dirty="0">
                 <a:solidFill>
                   <a:srgbClr val="D24726"/>
                 </a:solidFill>
@@ -15571,53 +15461,18 @@
               <a:t>new dataset </a:t>
             </a:r>
             <a:r>
-              <a:rPr lang="en-US" sz="1400" dirty="0" smtClean="0">
-                <a:latin typeface="Segoe UI" panose="020B0502040204020203" pitchFamily="34" charset="0"/>
-                <a:cs typeface="Segoe UI" panose="020B0502040204020203" pitchFamily="34" charset="0"/>
-              </a:rPr>
-              <a:t>(GTOS - published 2016) – large scale, high quality</a:t>
-            </a:r>
-            <a:r>
               <a:rPr lang="en-US" sz="1400" dirty="0">
                 <a:latin typeface="Segoe UI" panose="020B0502040204020203" pitchFamily="34" charset="0"/>
                 <a:cs typeface="Segoe UI" panose="020B0502040204020203" pitchFamily="34" charset="0"/>
               </a:rPr>
-              <a:t>. </a:t>
-            </a:r>
-            <a:r>
-              <a:rPr lang="en-US" sz="1400" i="1" dirty="0" smtClean="0">
-                <a:latin typeface="Segoe UI" panose="020B0502040204020203" pitchFamily="34" charset="0"/>
-                <a:cs typeface="Segoe UI" panose="020B0502040204020203" pitchFamily="34" charset="0"/>
-              </a:rPr>
-              <a:t>Coming </a:t>
+              <a:t>(GTOS - published 2016) – large scale, high quality. </a:t>
             </a:r>
             <a:r>
               <a:rPr lang="en-US" sz="1400" i="1" dirty="0">
                 <a:latin typeface="Segoe UI" panose="020B0502040204020203" pitchFamily="34" charset="0"/>
                 <a:cs typeface="Segoe UI" panose="020B0502040204020203" pitchFamily="34" charset="0"/>
               </a:rPr>
-              <a:t>soon</a:t>
-            </a:r>
-            <a:r>
-              <a:rPr lang="en-US" sz="1400" i="1" dirty="0" smtClean="0">
-                <a:latin typeface="Segoe UI" panose="020B0502040204020203" pitchFamily="34" charset="0"/>
-                <a:cs typeface="Segoe UI" panose="020B0502040204020203" pitchFamily="34" charset="0"/>
-              </a:rPr>
-              <a:t>, GTIS </a:t>
-            </a:r>
-            <a:r>
-              <a:rPr lang="en-US" sz="1400" i="1" dirty="0">
-                <a:latin typeface="Segoe UI" panose="020B0502040204020203" pitchFamily="34" charset="0"/>
-                <a:cs typeface="Segoe UI" panose="020B0502040204020203" pitchFamily="34" charset="0"/>
-              </a:rPr>
-              <a:t>(Ground Terrain in Indoor </a:t>
-            </a:r>
-            <a:r>
-              <a:rPr lang="en-US" sz="1400" i="1" dirty="0" smtClean="0">
-                <a:latin typeface="Segoe UI" panose="020B0502040204020203" pitchFamily="34" charset="0"/>
-                <a:cs typeface="Segoe UI" panose="020B0502040204020203" pitchFamily="34" charset="0"/>
-              </a:rPr>
-              <a:t>Scenes) – more challenges.</a:t>
+              <a:t>Coming soon, GTIS (Ground Terrain in Indoor Scenes) – more challenges.</a:t>
             </a:r>
           </a:p>
           <a:p>
@@ -15629,7 +15484,7 @@
               <a:defRPr/>
             </a:pPr>
             <a:r>
-              <a:rPr lang="en-US" sz="1400" dirty="0" smtClean="0">
+              <a:rPr lang="en-US" sz="1400" dirty="0">
                 <a:solidFill>
                   <a:srgbClr val="D24726"/>
                 </a:solidFill>
@@ -15639,28 +15494,24 @@
               <a:t>Best result </a:t>
             </a:r>
             <a:r>
-              <a:rPr lang="en-US" sz="1400" dirty="0" smtClean="0">
+              <a:rPr lang="en-US" sz="1400" dirty="0">
                 <a:latin typeface="Segoe UI" panose="020B0502040204020203" pitchFamily="34" charset="0"/>
                 <a:cs typeface="Segoe UI" panose="020B0502040204020203" pitchFamily="34" charset="0"/>
               </a:rPr>
               <a:t>compare </a:t>
             </a:r>
             <a:r>
-              <a:rPr lang="en-US" sz="1400" dirty="0" smtClean="0"/>
-              <a:t>with </a:t>
-            </a:r>
-            <a:r>
               <a:rPr lang="en-US" sz="1400" dirty="0"/>
-              <a:t>the state of art algorithms </a:t>
-            </a:r>
-            <a:r>
-              <a:rPr lang="en-US" sz="1400" dirty="0" smtClean="0">
+              <a:t>with the state of art algorithms </a:t>
+            </a:r>
+            <a:r>
+              <a:rPr lang="en-US" sz="1400" dirty="0">
                 <a:latin typeface="Segoe UI" panose="020B0502040204020203" pitchFamily="34" charset="0"/>
                 <a:cs typeface="Segoe UI" panose="020B0502040204020203" pitchFamily="34" charset="0"/>
               </a:rPr>
               <a:t>on the same dataset.</a:t>
             </a:r>
-            <a:endParaRPr lang="en-US" sz="1400" dirty="0" smtClean="0"/>
+            <a:endParaRPr lang="en-US" sz="1400" dirty="0"/>
           </a:p>
           <a:p>
             <a:pPr marL="0" indent="0">
@@ -15671,14 +15522,14 @@
               <a:defRPr/>
             </a:pPr>
             <a:r>
-              <a:rPr lang="en-US" sz="1400" dirty="0" smtClean="0">
+              <a:rPr lang="en-US" sz="1400" dirty="0">
                 <a:latin typeface="Segoe UI" panose="020B0502040204020203" pitchFamily="34" charset="0"/>
                 <a:cs typeface="Segoe UI" panose="020B0502040204020203" pitchFamily="34" charset="0"/>
               </a:rPr>
               <a:t>The key idea of solution in this paper is </a:t>
             </a:r>
             <a:r>
-              <a:rPr lang="en-US" sz="1400" dirty="0" smtClean="0">
+              <a:rPr lang="en-US" sz="1400" dirty="0">
                 <a:solidFill>
                   <a:srgbClr val="D24726"/>
                 </a:solidFill>
@@ -15688,7 +15539,7 @@
               <a:t>not complex </a:t>
             </a:r>
             <a:r>
-              <a:rPr lang="en-US" sz="1400" dirty="0" smtClean="0">
+              <a:rPr lang="en-US" sz="1400" dirty="0">
                 <a:latin typeface="Segoe UI" panose="020B0502040204020203" pitchFamily="34" charset="0"/>
                 <a:cs typeface="Segoe UI" panose="020B0502040204020203" pitchFamily="34" charset="0"/>
               </a:rPr>
@@ -15704,7 +15555,7 @@
               <a:defRPr/>
             </a:pPr>
             <a:r>
-              <a:rPr lang="en-US" sz="1400" dirty="0" smtClean="0">
+              <a:rPr lang="en-US" sz="1400" dirty="0">
                 <a:solidFill>
                   <a:srgbClr val="D24726"/>
                 </a:solidFill>
@@ -15714,18 +15565,11 @@
               <a:t>Published</a:t>
             </a:r>
             <a:r>
-              <a:rPr lang="en-US" sz="1400" dirty="0" smtClean="0">
-                <a:latin typeface="Segoe UI" panose="020B0502040204020203" pitchFamily="34" charset="0"/>
-                <a:cs typeface="Segoe UI" panose="020B0502040204020203" pitchFamily="34" charset="0"/>
-              </a:rPr>
-              <a:t> source code. You can </a:t>
-            </a:r>
-            <a:r>
               <a:rPr lang="en-US" sz="1400" dirty="0">
                 <a:latin typeface="Segoe UI" panose="020B0502040204020203" pitchFamily="34" charset="0"/>
                 <a:cs typeface="Segoe UI" panose="020B0502040204020203" pitchFamily="34" charset="0"/>
               </a:rPr>
-              <a:t>download it here </a:t>
+              <a:t> source code. You can download it here </a:t>
             </a:r>
             <a:r>
               <a:rPr lang="en-US" sz="1400" dirty="0">
@@ -15793,7 +15637,7 @@
           <a:effectLst/>
           <a:extLst>
             <a:ext uri="{C572A759-6A51-4108-AA02-DFA0A04FC94B}">
-              <ma14:wrappingTextBoxFlag xmlns="" xmlns:ma14="http://schemas.microsoft.com/office/mac/drawingml/2011/main"/>
+              <ma14:wrappingTextBoxFlag xmlns:ma14="http://schemas.microsoft.com/office/mac/drawingml/2011/main" xmlns=""/>
             </a:ext>
           </a:extLst>
         </p:spPr>
@@ -15900,18 +15744,13 @@
           <a:lstStyle/>
           <a:p>
             <a:r>
-              <a:rPr lang="en-US" sz="1400" b="1" dirty="0" smtClean="0"/>
+              <a:rPr lang="en-US" sz="1400" b="1" dirty="0"/>
               <a:t>Figure 1</a:t>
             </a:r>
             <a:r>
               <a:rPr lang="en-US" sz="1400" dirty="0"/>
-              <a:t>. </a:t>
-            </a:r>
-            <a:r>
-              <a:rPr lang="en-US" sz="1400" dirty="0" smtClean="0"/>
-              <a:t>An image from GTOS dataset</a:t>
-            </a:r>
-            <a:endParaRPr lang="en-US" sz="1400" dirty="0"/>
+              <a:t>. An image from GTOS dataset</a:t>
+            </a:r>
           </a:p>
         </p:txBody>
       </p:sp>
@@ -15925,13 +15764,13 @@
   <p:clrMapOvr>
     <a:masterClrMapping/>
   </p:clrMapOvr>
-  <mc:AlternateContent xmlns:mc="http://schemas.openxmlformats.org/markup-compatibility/2006">
-    <mc:Choice xmlns:p15="http://schemas.microsoft.com/office/powerpoint/2012/main" Requires="p15">
+  <mc:AlternateContent xmlns:mc="http://schemas.openxmlformats.org/markup-compatibility/2006" xmlns:p15="http://schemas.microsoft.com/office/powerpoint/2012/main">
+    <mc:Choice Requires="p15">
       <p:transition xmlns:p14="http://schemas.microsoft.com/office/powerpoint/2010/main" spd="slow" p14:dur="2000">
         <p15:prstTrans prst="drape"/>
       </p:transition>
     </mc:Choice>
-    <mc:Fallback>
+    <mc:Fallback xmlns="">
       <p:transition spd="slow">
         <p:fade/>
       </p:transition>

</xml_diff>